<commit_message>
FIX(solucao tecnica.pdf):alteracao na solucao tecnica
</commit_message>
<xml_diff>
--- a/documentacao/Solução Técnica/solução técnica.pptx
+++ b/documentacao/Solução Técnica/solução técnica.pptx
@@ -259,7 +259,7 @@
           <a:p>
             <a:fld id="{CE287315-D1CA-4A5F-ADDA-99A6C3257D47}" type="datetimeFigureOut">
               <a:rPr lang="pt-BR" smtClean="0"/>
-              <a:t>20/10/2021</a:t>
+              <a:t>10/11/2021</a:t>
             </a:fld>
             <a:endParaRPr lang="pt-BR"/>
           </a:p>
@@ -457,7 +457,7 @@
           <a:p>
             <a:fld id="{CE287315-D1CA-4A5F-ADDA-99A6C3257D47}" type="datetimeFigureOut">
               <a:rPr lang="pt-BR" smtClean="0"/>
-              <a:t>20/10/2021</a:t>
+              <a:t>10/11/2021</a:t>
             </a:fld>
             <a:endParaRPr lang="pt-BR"/>
           </a:p>
@@ -665,7 +665,7 @@
           <a:p>
             <a:fld id="{CE287315-D1CA-4A5F-ADDA-99A6C3257D47}" type="datetimeFigureOut">
               <a:rPr lang="pt-BR" smtClean="0"/>
-              <a:t>20/10/2021</a:t>
+              <a:t>10/11/2021</a:t>
             </a:fld>
             <a:endParaRPr lang="pt-BR"/>
           </a:p>
@@ -863,7 +863,7 @@
           <a:p>
             <a:fld id="{CE287315-D1CA-4A5F-ADDA-99A6C3257D47}" type="datetimeFigureOut">
               <a:rPr lang="pt-BR" smtClean="0"/>
-              <a:t>20/10/2021</a:t>
+              <a:t>10/11/2021</a:t>
             </a:fld>
             <a:endParaRPr lang="pt-BR"/>
           </a:p>
@@ -1138,7 +1138,7 @@
           <a:p>
             <a:fld id="{CE287315-D1CA-4A5F-ADDA-99A6C3257D47}" type="datetimeFigureOut">
               <a:rPr lang="pt-BR" smtClean="0"/>
-              <a:t>20/10/2021</a:t>
+              <a:t>10/11/2021</a:t>
             </a:fld>
             <a:endParaRPr lang="pt-BR"/>
           </a:p>
@@ -1403,7 +1403,7 @@
           <a:p>
             <a:fld id="{CE287315-D1CA-4A5F-ADDA-99A6C3257D47}" type="datetimeFigureOut">
               <a:rPr lang="pt-BR" smtClean="0"/>
-              <a:t>20/10/2021</a:t>
+              <a:t>10/11/2021</a:t>
             </a:fld>
             <a:endParaRPr lang="pt-BR"/>
           </a:p>
@@ -1815,7 +1815,7 @@
           <a:p>
             <a:fld id="{CE287315-D1CA-4A5F-ADDA-99A6C3257D47}" type="datetimeFigureOut">
               <a:rPr lang="pt-BR" smtClean="0"/>
-              <a:t>20/10/2021</a:t>
+              <a:t>10/11/2021</a:t>
             </a:fld>
             <a:endParaRPr lang="pt-BR"/>
           </a:p>
@@ -1956,7 +1956,7 @@
           <a:p>
             <a:fld id="{CE287315-D1CA-4A5F-ADDA-99A6C3257D47}" type="datetimeFigureOut">
               <a:rPr lang="pt-BR" smtClean="0"/>
-              <a:t>20/10/2021</a:t>
+              <a:t>10/11/2021</a:t>
             </a:fld>
             <a:endParaRPr lang="pt-BR"/>
           </a:p>
@@ -2069,7 +2069,7 @@
           <a:p>
             <a:fld id="{CE287315-D1CA-4A5F-ADDA-99A6C3257D47}" type="datetimeFigureOut">
               <a:rPr lang="pt-BR" smtClean="0"/>
-              <a:t>20/10/2021</a:t>
+              <a:t>10/11/2021</a:t>
             </a:fld>
             <a:endParaRPr lang="pt-BR"/>
           </a:p>
@@ -2380,7 +2380,7 @@
           <a:p>
             <a:fld id="{CE287315-D1CA-4A5F-ADDA-99A6C3257D47}" type="datetimeFigureOut">
               <a:rPr lang="pt-BR" smtClean="0"/>
-              <a:t>20/10/2021</a:t>
+              <a:t>10/11/2021</a:t>
             </a:fld>
             <a:endParaRPr lang="pt-BR"/>
           </a:p>
@@ -2668,7 +2668,7 @@
           <a:p>
             <a:fld id="{CE287315-D1CA-4A5F-ADDA-99A6C3257D47}" type="datetimeFigureOut">
               <a:rPr lang="pt-BR" smtClean="0"/>
-              <a:t>20/10/2021</a:t>
+              <a:t>10/11/2021</a:t>
             </a:fld>
             <a:endParaRPr lang="pt-BR"/>
           </a:p>
@@ -2909,7 +2909,7 @@
           <a:p>
             <a:fld id="{CE287315-D1CA-4A5F-ADDA-99A6C3257D47}" type="datetimeFigureOut">
               <a:rPr lang="pt-BR" smtClean="0"/>
-              <a:t>20/10/2021</a:t>
+              <a:t>10/11/2021</a:t>
             </a:fld>
             <a:endParaRPr lang="pt-BR"/>
           </a:p>
@@ -3328,62 +3328,6 @@
       </p:grpSpPr>
       <p:sp>
         <p:nvSpPr>
-          <p:cNvPr id="117" name="Retângulo 116">
-            <a:extLst>
-              <a:ext uri="{FF2B5EF4-FFF2-40B4-BE49-F238E27FC236}">
-                <a16:creationId xmlns:a16="http://schemas.microsoft.com/office/drawing/2014/main" id="{4B45CE76-1823-4C51-9F19-48901F7610DE}"/>
-              </a:ext>
-            </a:extLst>
-          </p:cNvPr>
-          <p:cNvSpPr/>
-          <p:nvPr/>
-        </p:nvSpPr>
-        <p:spPr>
-          <a:xfrm>
-            <a:off x="0" y="0"/>
-            <a:ext cx="12192000" cy="6858000"/>
-          </a:xfrm>
-          <a:prstGeom prst="rect">
-            <a:avLst/>
-          </a:prstGeom>
-          <a:solidFill>
-            <a:schemeClr val="bg1"/>
-          </a:solidFill>
-          <a:ln>
-            <a:noFill/>
-          </a:ln>
-        </p:spPr>
-        <p:style>
-          <a:lnRef idx="2">
-            <a:schemeClr val="accent1">
-              <a:shade val="50000"/>
-            </a:schemeClr>
-          </a:lnRef>
-          <a:fillRef idx="1">
-            <a:schemeClr val="accent1"/>
-          </a:fillRef>
-          <a:effectRef idx="0">
-            <a:schemeClr val="accent1"/>
-          </a:effectRef>
-          <a:fontRef idx="minor">
-            <a:schemeClr val="lt1"/>
-          </a:fontRef>
-        </p:style>
-        <p:txBody>
-          <a:bodyPr rtlCol="0" anchor="ctr"/>
-          <a:lstStyle/>
-          <a:p>
-            <a:pPr algn="ctr"/>
-            <a:endParaRPr lang="pt-BR" dirty="0">
-              <a:solidFill>
-                <a:schemeClr val="bg1"/>
-              </a:solidFill>
-            </a:endParaRPr>
-          </a:p>
-        </p:txBody>
-      </p:sp>
-      <p:sp>
-        <p:nvSpPr>
           <p:cNvPr id="4" name="Nuvem 3">
             <a:extLst>
               <a:ext uri="{FF2B5EF4-FFF2-40B4-BE49-F238E27FC236}">
@@ -4313,7 +4257,7 @@
         </p:nvGrpSpPr>
         <p:grpSpPr>
           <a:xfrm>
-            <a:off x="6067023" y="4017416"/>
+            <a:off x="6067023" y="5109373"/>
             <a:ext cx="2515245" cy="921259"/>
             <a:chOff x="3992719" y="3795742"/>
             <a:chExt cx="2515245" cy="921259"/>
@@ -5117,7 +5061,7 @@
         </p:nvCxnSpPr>
         <p:spPr>
           <a:xfrm flipH="1" flipV="1">
-            <a:off x="8617060" y="4350384"/>
+            <a:off x="8617060" y="5442341"/>
             <a:ext cx="340595" cy="29340"/>
           </a:xfrm>
           <a:prstGeom prst="line">
@@ -5308,6 +5252,212 @@
           </a:p>
         </p:txBody>
       </p:sp>
+      <p:grpSp>
+        <p:nvGrpSpPr>
+          <p:cNvPr id="52" name="Agrupar 51">
+            <a:extLst>
+              <a:ext uri="{FF2B5EF4-FFF2-40B4-BE49-F238E27FC236}">
+                <a16:creationId xmlns:a16="http://schemas.microsoft.com/office/drawing/2014/main" id="{DD5594E7-F112-45AD-9331-8EBBCBD60F96}"/>
+              </a:ext>
+            </a:extLst>
+          </p:cNvPr>
+          <p:cNvGrpSpPr/>
+          <p:nvPr/>
+        </p:nvGrpSpPr>
+        <p:grpSpPr>
+          <a:xfrm>
+            <a:off x="6049299" y="4008285"/>
+            <a:ext cx="2515245" cy="961719"/>
+            <a:chOff x="3992719" y="3795742"/>
+            <a:chExt cx="2515245" cy="961719"/>
+          </a:xfrm>
+        </p:grpSpPr>
+        <p:sp>
+          <p:nvSpPr>
+            <p:cNvPr id="55" name="Retângulo 54">
+              <a:extLst>
+                <a:ext uri="{FF2B5EF4-FFF2-40B4-BE49-F238E27FC236}">
+                  <a16:creationId xmlns:a16="http://schemas.microsoft.com/office/drawing/2014/main" id="{74B8137A-7FB4-4A6F-A4BF-764EEFDE7A32}"/>
+                </a:ext>
+              </a:extLst>
+            </p:cNvPr>
+            <p:cNvSpPr/>
+            <p:nvPr/>
+          </p:nvSpPr>
+          <p:spPr>
+            <a:xfrm>
+              <a:off x="3992719" y="3795742"/>
+              <a:ext cx="2515245" cy="903146"/>
+            </a:xfrm>
+            <a:prstGeom prst="rect">
+              <a:avLst/>
+            </a:prstGeom>
+            <a:noFill/>
+            <a:ln w="28575">
+              <a:solidFill>
+                <a:schemeClr val="tx1"/>
+              </a:solidFill>
+              <a:prstDash val="dash"/>
+            </a:ln>
+          </p:spPr>
+          <p:style>
+            <a:lnRef idx="2">
+              <a:schemeClr val="accent1">
+                <a:shade val="50000"/>
+              </a:schemeClr>
+            </a:lnRef>
+            <a:fillRef idx="1">
+              <a:schemeClr val="accent1"/>
+            </a:fillRef>
+            <a:effectRef idx="0">
+              <a:schemeClr val="accent1"/>
+            </a:effectRef>
+            <a:fontRef idx="minor">
+              <a:schemeClr val="lt1"/>
+            </a:fontRef>
+          </p:style>
+          <p:txBody>
+            <a:bodyPr rtlCol="0" anchor="ctr"/>
+            <a:lstStyle/>
+            <a:p>
+              <a:pPr algn="ctr"/>
+              <a:endParaRPr lang="pt-BR"/>
+            </a:p>
+          </p:txBody>
+        </p:sp>
+        <p:sp>
+          <p:nvSpPr>
+            <p:cNvPr id="56" name="CaixaDeTexto 55">
+              <a:extLst>
+                <a:ext uri="{FF2B5EF4-FFF2-40B4-BE49-F238E27FC236}">
+                  <a16:creationId xmlns:a16="http://schemas.microsoft.com/office/drawing/2014/main" id="{861D45D2-3C51-47F9-B107-2E9583EBF170}"/>
+                </a:ext>
+              </a:extLst>
+            </p:cNvPr>
+            <p:cNvSpPr txBox="1"/>
+            <p:nvPr/>
+          </p:nvSpPr>
+          <p:spPr>
+            <a:xfrm>
+              <a:off x="4654756" y="4388129"/>
+              <a:ext cx="1226618" cy="369332"/>
+            </a:xfrm>
+            <a:prstGeom prst="rect">
+              <a:avLst/>
+            </a:prstGeom>
+            <a:noFill/>
+          </p:spPr>
+          <p:txBody>
+            <a:bodyPr wrap="none" rtlCol="0">
+              <a:spAutoFit/>
+            </a:bodyPr>
+            <a:lstStyle/>
+            <a:p>
+              <a:r>
+                <a:rPr lang="pt-BR" dirty="0">
+                  <a:latin typeface="Poppins Medium" panose="00000600000000000000" pitchFamily="2" charset="0"/>
+                  <a:cs typeface="Poppins Medium" panose="00000600000000000000" pitchFamily="2" charset="0"/>
+                </a:rPr>
+                <a:t>API Slack</a:t>
+              </a:r>
+            </a:p>
+          </p:txBody>
+        </p:sp>
+      </p:grpSp>
+      <p:pic>
+        <p:nvPicPr>
+          <p:cNvPr id="1026" name="Picture 2" descr="Slack fora do ar? Falhas e problemas acontecendo neste momento. |  Downdetector">
+            <a:extLst>
+              <a:ext uri="{FF2B5EF4-FFF2-40B4-BE49-F238E27FC236}">
+                <a16:creationId xmlns:a16="http://schemas.microsoft.com/office/drawing/2014/main" id="{B1A41009-0A1E-49E7-8C75-EC5117360F15}"/>
+              </a:ext>
+            </a:extLst>
+          </p:cNvPr>
+          <p:cNvPicPr>
+            <a:picLocks noChangeAspect="1" noChangeArrowheads="1"/>
+          </p:cNvPicPr>
+          <p:nvPr/>
+        </p:nvPicPr>
+        <p:blipFill>
+          <a:blip r:embed="rId21">
+            <a:extLst>
+              <a:ext uri="{28A0092B-C50C-407E-A947-70E740481C1C}">
+                <a14:useLocalDpi xmlns:a14="http://schemas.microsoft.com/office/drawing/2010/main" val="0"/>
+              </a:ext>
+            </a:extLst>
+          </a:blip>
+          <a:srcRect/>
+          <a:stretch>
+            <a:fillRect/>
+          </a:stretch>
+        </p:blipFill>
+        <p:spPr bwMode="auto">
+          <a:xfrm>
+            <a:off x="6266207" y="3973215"/>
+            <a:ext cx="2114448" cy="865602"/>
+          </a:xfrm>
+          <a:prstGeom prst="rect">
+            <a:avLst/>
+          </a:prstGeom>
+          <a:noFill/>
+          <a:extLst>
+            <a:ext uri="{909E8E84-426E-40DD-AFC4-6F175D3DCCD1}">
+              <a14:hiddenFill xmlns:a14="http://schemas.microsoft.com/office/drawing/2010/main">
+                <a:solidFill>
+                  <a:srgbClr val="FFFFFF"/>
+                </a:solidFill>
+              </a14:hiddenFill>
+            </a:ext>
+          </a:extLst>
+        </p:spPr>
+      </p:pic>
+      <p:cxnSp>
+        <p:nvCxnSpPr>
+          <p:cNvPr id="57" name="Conector reto 56">
+            <a:extLst>
+              <a:ext uri="{FF2B5EF4-FFF2-40B4-BE49-F238E27FC236}">
+                <a16:creationId xmlns:a16="http://schemas.microsoft.com/office/drawing/2014/main" id="{623F9596-5D30-472C-8A20-4BDBFCA235B5}"/>
+              </a:ext>
+            </a:extLst>
+          </p:cNvPr>
+          <p:cNvCxnSpPr>
+            <a:cxnSpLocks/>
+          </p:cNvCxnSpPr>
+          <p:nvPr/>
+        </p:nvCxnSpPr>
+        <p:spPr>
+          <a:xfrm>
+            <a:off x="5063436" y="3000861"/>
+            <a:ext cx="1419929" cy="1024227"/>
+          </a:xfrm>
+          <a:prstGeom prst="line">
+            <a:avLst/>
+          </a:prstGeom>
+          <a:ln w="28575">
+            <a:solidFill>
+              <a:schemeClr val="tx1">
+                <a:lumMod val="95000"/>
+                <a:lumOff val="5000"/>
+              </a:schemeClr>
+            </a:solidFill>
+            <a:prstDash val="dash"/>
+          </a:ln>
+        </p:spPr>
+        <p:style>
+          <a:lnRef idx="1">
+            <a:schemeClr val="accent1"/>
+          </a:lnRef>
+          <a:fillRef idx="0">
+            <a:schemeClr val="accent1"/>
+          </a:fillRef>
+          <a:effectRef idx="0">
+            <a:schemeClr val="accent1"/>
+          </a:effectRef>
+          <a:fontRef idx="minor">
+            <a:schemeClr val="tx1"/>
+          </a:fontRef>
+        </p:style>
+      </p:cxnSp>
     </p:spTree>
     <p:extLst>
       <p:ext uri="{BB962C8B-B14F-4D97-AF65-F5344CB8AC3E}">

</xml_diff>